<commit_message>
asi si se hacian las fichas
</commit_message>
<xml_diff>
--- a/HT-4/Optica BAC-07-Estructura del negocio.pptx
+++ b/HT-4/Optica BAC-07-Estructura del negocio.pptx
@@ -2202,7 +2202,7 @@
         </p:nvCxnSpPr>
         <p:spPr>
           <a:xfrm>
-            <a:off x="7283164" y="1702218"/>
+            <a:off x="7287365" y="1784662"/>
             <a:ext cx="589995" cy="0"/>
           </a:xfrm>
           <a:prstGeom prst="line">
@@ -2292,7 +2292,7 @@
         </p:nvSpPr>
         <p:spPr>
           <a:xfrm>
-            <a:off x="7393177" y="1425219"/>
+            <a:off x="7397378" y="1507663"/>
             <a:ext cx="380232" cy="276999"/>
           </a:xfrm>
           <a:prstGeom prst="rect">
@@ -2334,7 +2334,7 @@
         </p:nvSpPr>
         <p:spPr>
           <a:xfrm>
-            <a:off x="7388975" y="2630357"/>
+            <a:off x="7397378" y="2969811"/>
             <a:ext cx="397865" cy="276999"/>
           </a:xfrm>
           <a:prstGeom prst="rect">
@@ -2376,7 +2376,7 @@
         </p:nvCxnSpPr>
         <p:spPr>
           <a:xfrm>
-            <a:off x="7280823" y="2895202"/>
+            <a:off x="7289226" y="3234656"/>
             <a:ext cx="588134" cy="2"/>
           </a:xfrm>
           <a:prstGeom prst="line">
@@ -3162,7 +3162,7 @@
         </p:nvCxnSpPr>
         <p:spPr>
           <a:xfrm>
-            <a:off x="7277284" y="2008401"/>
+            <a:off x="7276465" y="2111385"/>
             <a:ext cx="589995" cy="0"/>
           </a:xfrm>
           <a:prstGeom prst="line">
@@ -3210,7 +3210,7 @@
         </p:nvSpPr>
         <p:spPr>
           <a:xfrm>
-            <a:off x="7387297" y="1731402"/>
+            <a:off x="7386478" y="1834386"/>
             <a:ext cx="380232" cy="276999"/>
           </a:xfrm>
           <a:prstGeom prst="rect">
@@ -3254,7 +3254,7 @@
         </p:nvCxnSpPr>
         <p:spPr>
           <a:xfrm>
-            <a:off x="7286168" y="2297624"/>
+            <a:off x="7281370" y="2493628"/>
             <a:ext cx="589995" cy="0"/>
           </a:xfrm>
           <a:prstGeom prst="line">
@@ -3302,7 +3302,7 @@
         </p:nvSpPr>
         <p:spPr>
           <a:xfrm>
-            <a:off x="7396181" y="2020625"/>
+            <a:off x="7391383" y="2216629"/>
             <a:ext cx="380232" cy="276999"/>
           </a:xfrm>
           <a:prstGeom prst="rect">
@@ -3346,7 +3346,7 @@
         </p:nvCxnSpPr>
         <p:spPr>
           <a:xfrm>
-            <a:off x="7278962" y="2593753"/>
+            <a:off x="7278948" y="2842000"/>
             <a:ext cx="589995" cy="0"/>
           </a:xfrm>
           <a:prstGeom prst="line">
@@ -3394,7 +3394,7 @@
         </p:nvSpPr>
         <p:spPr>
           <a:xfrm>
-            <a:off x="7388989" y="2362682"/>
+            <a:off x="7388975" y="2610929"/>
             <a:ext cx="380232" cy="276999"/>
           </a:xfrm>
           <a:prstGeom prst="rect">
@@ -3414,98 +3414,6 @@
                 <a:cs typeface="Arial" panose="020B0604020202020204" pitchFamily="34" charset="0"/>
               </a:rPr>
               <a:t>D1</a:t>
-            </a:r>
-            <a:endParaRPr lang="es-CO" sz="1200" dirty="0">
-              <a:latin typeface="Arial" panose="020B0604020202020204" pitchFamily="34" charset="0"/>
-              <a:cs typeface="Arial" panose="020B0604020202020204" pitchFamily="34" charset="0"/>
-            </a:endParaRPr>
-          </a:p>
-        </p:txBody>
-      </p:sp>
-      <p:cxnSp>
-        <p:nvCxnSpPr>
-          <p:cNvPr id="1024" name="10 Conector recto">
-            <a:extLst>
-              <a:ext uri="{FF2B5EF4-FFF2-40B4-BE49-F238E27FC236}">
-                <a16:creationId xmlns:a16="http://schemas.microsoft.com/office/drawing/2014/main" id="{588D08F8-6561-B4F5-A124-0061A42AC029}"/>
-              </a:ext>
-            </a:extLst>
-          </p:cNvPr>
-          <p:cNvCxnSpPr>
-            <a:cxnSpLocks/>
-          </p:cNvCxnSpPr>
-          <p:nvPr/>
-        </p:nvCxnSpPr>
-        <p:spPr>
-          <a:xfrm>
-            <a:off x="7283163" y="3210149"/>
-            <a:ext cx="589995" cy="0"/>
-          </a:xfrm>
-          <a:prstGeom prst="line">
-            <a:avLst/>
-          </a:prstGeom>
-          <a:solidFill>
-            <a:schemeClr val="bg1"/>
-          </a:solidFill>
-          <a:ln w="12700" cap="flat">
-            <a:solidFill>
-              <a:schemeClr val="tx1"/>
-            </a:solidFill>
-            <a:headEnd type="oval" w="sm" len="sm"/>
-            <a:tailEnd type="oval" w="sm" len="sm"/>
-          </a:ln>
-        </p:spPr>
-        <p:style>
-          <a:lnRef idx="2">
-            <a:schemeClr val="accent1">
-              <a:shade val="50000"/>
-            </a:schemeClr>
-          </a:lnRef>
-          <a:fillRef idx="1">
-            <a:schemeClr val="accent1"/>
-          </a:fillRef>
-          <a:effectRef idx="0">
-            <a:schemeClr val="accent1"/>
-          </a:effectRef>
-          <a:fontRef idx="minor">
-            <a:schemeClr val="lt1"/>
-          </a:fontRef>
-        </p:style>
-      </p:cxnSp>
-      <p:sp>
-        <p:nvSpPr>
-          <p:cNvPr id="1025" name="12 CuadroTexto">
-            <a:extLst>
-              <a:ext uri="{FF2B5EF4-FFF2-40B4-BE49-F238E27FC236}">
-                <a16:creationId xmlns:a16="http://schemas.microsoft.com/office/drawing/2014/main" id="{27977BF3-9103-9F1D-112C-8B4E273C300A}"/>
-              </a:ext>
-            </a:extLst>
-          </p:cNvPr>
-          <p:cNvSpPr txBox="1"/>
-          <p:nvPr/>
-        </p:nvSpPr>
-        <p:spPr>
-          <a:xfrm>
-            <a:off x="7381808" y="2968411"/>
-            <a:ext cx="397866" cy="276999"/>
-          </a:xfrm>
-          <a:prstGeom prst="rect">
-            <a:avLst/>
-          </a:prstGeom>
-          <a:noFill/>
-        </p:spPr>
-        <p:txBody>
-          <a:bodyPr wrap="none" rtlCol="0">
-            <a:spAutoFit/>
-          </a:bodyPr>
-          <a:lstStyle/>
-          <a:p>
-            <a:r>
-              <a:rPr lang="es-MX" sz="1200" dirty="0">
-                <a:latin typeface="Arial" panose="020B0604020202020204" pitchFamily="34" charset="0"/>
-                <a:cs typeface="Arial" panose="020B0604020202020204" pitchFamily="34" charset="0"/>
-              </a:rPr>
-              <a:t>M2</a:t>
             </a:r>
             <a:endParaRPr lang="es-CO" sz="1200" dirty="0">
               <a:latin typeface="Arial" panose="020B0604020202020204" pitchFamily="34" charset="0"/>

</xml_diff>